<commit_message>
again, update to pptx documentation
</commit_message>
<xml_diff>
--- a/documentation/docs/presentation/HTMLSC-presentation.pptx
+++ b/documentation/docs/presentation/HTMLSC-presentation.pptx
@@ -2875,11 +2875,46 @@
           <a:p>
             <a:r>
               <a:rPr lang="de-DE" dirty="0" err="1" smtClean="0"/>
+              <a:t>Use</a:t>
+            </a:r>
+            <a:r>
+              <a:rPr lang="de-DE" dirty="0" smtClean="0"/>
+              <a:t> HTML </a:t>
+            </a:r>
+            <a:r>
+              <a:rPr lang="de-DE" dirty="0" err="1" smtClean="0"/>
+              <a:t>parser</a:t>
+            </a:r>
+            <a:r>
+              <a:rPr lang="de-DE" dirty="0" smtClean="0"/>
+              <a:t> </a:t>
+            </a:r>
+            <a:r>
+              <a:rPr lang="de-DE" dirty="0" err="1" smtClean="0"/>
+              <a:t>with</a:t>
+            </a:r>
+            <a:r>
+              <a:rPr lang="de-DE" dirty="0" smtClean="0"/>
+              <a:t> minimal </a:t>
+            </a:r>
+            <a:r>
+              <a:rPr lang="de-DE" dirty="0" err="1" smtClean="0"/>
+              <a:t>dependencies</a:t>
+            </a:r>
+            <a:endParaRPr lang="de-DE" dirty="0" smtClean="0"/>
+          </a:p>
+          <a:p>
+            <a:r>
+              <a:rPr lang="de-DE" dirty="0" err="1" smtClean="0"/>
               <a:t>Implement</a:t>
             </a:r>
             <a:r>
               <a:rPr lang="de-DE" dirty="0" smtClean="0"/>
-              <a:t> in Groovy</a:t>
+              <a:t> </a:t>
+            </a:r>
+            <a:r>
+              <a:rPr lang="de-DE" dirty="0" smtClean="0"/>
+              <a:t>in Groovy</a:t>
             </a:r>
           </a:p>
           <a:p>
@@ -2916,12 +2951,6 @@
               <a:rPr lang="de-DE" dirty="0" smtClean="0"/>
               <a:t> simple</a:t>
             </a:r>
-          </a:p>
-          <a:p>
-            <a:pPr marL="457200" lvl="1" indent="0">
-              <a:buNone/>
-            </a:pPr>
-            <a:endParaRPr lang="de-DE" dirty="0" smtClean="0"/>
           </a:p>
           <a:p>
             <a:pPr marL="457200" lvl="1" indent="0">
@@ -4172,6 +4201,13 @@
   <p:clrMapOvr>
     <a:masterClrMapping/>
   </p:clrMapOvr>
+  <p:timing>
+    <p:tnLst>
+      <p:par>
+        <p:cTn xmlns:p14="http://schemas.microsoft.com/office/powerpoint/2010/main" id="1" dur="indefinite" restart="never" nodeType="tmRoot"/>
+      </p:par>
+    </p:tnLst>
+  </p:timing>
 </p:sld>
 </file>
 

</xml_diff>